<commit_message>
review for lec07-verilog and fix midterm slides
</commit_message>
<xml_diff>
--- a/Lectures/lec05-RTL_design/lab-midterm.pptx
+++ b/Lectures/lec05-RTL_design/lab-midterm.pptx
@@ -5074,15 +5074,7 @@
             </a:pPr>
             <a:r>
               <a:rPr lang="en-US" altLang="zh-TW" sz="2000" dirty="0" smtClean="0"/>
-              <a:t>Basic: </a:t>
-            </a:r>
-            <a:r>
-              <a:rPr lang="en-US" altLang="zh-TW" sz="2000" dirty="0" smtClean="0"/>
-              <a:t>60</a:t>
-            </a:r>
-            <a:r>
-              <a:rPr lang="en-US" altLang="zh-TW" sz="2000" dirty="0" smtClean="0"/>
-              <a:t>%</a:t>
+              <a:t>Basic: 60%</a:t>
             </a:r>
           </a:p>
           <a:p>
@@ -5115,23 +5107,7 @@
             </a:pPr>
             <a:r>
               <a:rPr lang="en-US" altLang="zh-TW" sz="2000" dirty="0" smtClean="0"/>
-              <a:t>Option </a:t>
-            </a:r>
-            <a:r>
-              <a:rPr lang="en-US" altLang="zh-TW" sz="2000" dirty="0" smtClean="0"/>
-              <a:t>1: </a:t>
-            </a:r>
-            <a:r>
-              <a:rPr lang="en-US" altLang="zh-TW" sz="2000" dirty="0" smtClean="0"/>
-              <a:t>control the counting by buttons (+</a:t>
-            </a:r>
-            <a:r>
-              <a:rPr lang="en-US" altLang="zh-TW" sz="2000" dirty="0" smtClean="0"/>
-              <a:t>10</a:t>
-            </a:r>
-            <a:r>
-              <a:rPr lang="en-US" altLang="zh-TW" sz="2000" dirty="0" smtClean="0"/>
-              <a:t>%)</a:t>
+              <a:t>Option 1: control the counting by buttons (+10%)</a:t>
             </a:r>
           </a:p>
           <a:p>
@@ -5144,7 +5120,6 @@
               <a:rPr lang="en-US" altLang="zh-TW" sz="1600" dirty="0" smtClean="0"/>
               <a:t>Implement start/stop/reset buttons</a:t>
             </a:r>
-            <a:endParaRPr lang="en-US" altLang="zh-TW" sz="1600" dirty="0" smtClean="0"/>
           </a:p>
           <a:p>
             <a:pPr eaLnBrk="1" hangingPunct="1">
@@ -5154,11 +5129,7 @@
             </a:pPr>
             <a:r>
               <a:rPr lang="en-US" altLang="zh-TW" sz="2000" dirty="0" smtClean="0"/>
-              <a:t>Option </a:t>
-            </a:r>
-            <a:r>
-              <a:rPr lang="en-US" altLang="zh-TW" sz="2000" dirty="0" smtClean="0"/>
-              <a:t>2: CSS (compare-and-store) (+10%)</a:t>
+              <a:t>Option 2: CSS (compare-and-store) (+10%)</a:t>
             </a:r>
           </a:p>
           <a:p>
@@ -5202,15 +5173,7 @@
             </a:pPr>
             <a:r>
               <a:rPr lang="en-US" altLang="zh-TW" sz="2000" dirty="0" smtClean="0"/>
-              <a:t>Option 3: </a:t>
-            </a:r>
-            <a:r>
-              <a:rPr lang="en-US" altLang="zh-TW" sz="2000" dirty="0" smtClean="0"/>
-              <a:t>make the time display blink </a:t>
-            </a:r>
-            <a:r>
-              <a:rPr lang="en-US" altLang="zh-TW" sz="2000" dirty="0" smtClean="0"/>
-              <a:t>(+10%)</a:t>
+              <a:t>Option 3: make the time display blink (+10%)</a:t>
             </a:r>
           </a:p>
           <a:p>
@@ -5223,7 +5186,6 @@
               <a:rPr lang="en-US" altLang="zh-TW" sz="1600" dirty="0" smtClean="0"/>
               <a:t>After pressing another button C</a:t>
             </a:r>
-            <a:endParaRPr lang="en-US" altLang="zh-TW" sz="1600" dirty="0" smtClean="0"/>
           </a:p>
           <a:p>
             <a:pPr eaLnBrk="1" hangingPunct="1">
@@ -5551,13 +5513,8 @@
             </a:r>
             <a:r>
               <a:rPr lang="en-US" altLang="zh-TW" sz="1800" dirty="0" smtClean="0"/>
-              <a:t> when you can see every word </a:t>
-            </a:r>
-            <a:r>
-              <a:rPr lang="en-US" altLang="zh-TW" sz="1800" dirty="0" smtClean="0"/>
-              <a:t>clearly</a:t>
-            </a:r>
-            <a:endParaRPr lang="en-US" altLang="zh-TW" sz="1800" dirty="0" smtClean="0"/>
+              <a:t> when you can see every word clearly</a:t>
+            </a:r>
           </a:p>
         </p:txBody>
       </p:sp>

</xml_diff>